<commit_message>
commited final revision of slides
</commit_message>
<xml_diff>
--- a/presentation_slides/Slides_MichailG.pptx
+++ b/presentation_slides/Slides_MichailG.pptx
@@ -5,10 +5,10 @@
     <p:sldMasterId id="2147483648" r:id="rId1"/>
   </p:sldMasterIdLst>
   <p:notesMasterIdLst>
-    <p:notesMasterId r:id="rId14"/>
+    <p:notesMasterId r:id="rId16"/>
   </p:notesMasterIdLst>
   <p:handoutMasterIdLst>
-    <p:handoutMasterId r:id="rId15"/>
+    <p:handoutMasterId r:id="rId17"/>
   </p:handoutMasterIdLst>
   <p:sldIdLst>
     <p:sldId id="272" r:id="rId2"/>
@@ -22,7 +22,9 @@
     <p:sldId id="279" r:id="rId10"/>
     <p:sldId id="280" r:id="rId11"/>
     <p:sldId id="281" r:id="rId12"/>
-    <p:sldId id="273" r:id="rId13"/>
+    <p:sldId id="282" r:id="rId13"/>
+    <p:sldId id="283" r:id="rId14"/>
+    <p:sldId id="273" r:id="rId15"/>
   </p:sldIdLst>
   <p:sldSz cx="9144000" cy="6858000" type="screen4x3"/>
   <p:notesSz cx="6858000" cy="9144000"/>
@@ -982,6 +984,203 @@
               <a:rPr lang="en-US" smtClean="0"/>
               <a:pPr/>
               <a:t>12</a:t>
+            </a:fld>
+            <a:endParaRPr lang="en-US"/>
+          </a:p>
+        </p:txBody>
+      </p:sp>
+    </p:spTree>
+  </p:cSld>
+  <p:clrMapOvr>
+    <a:masterClrMapping/>
+  </p:clrMapOvr>
+</p:notes>
+</file>
+
+<file path=ppt/notesSlides/notesSlide11.xml><?xml version="1.0" encoding="utf-8"?>
+<p:notes xmlns:a="http://schemas.openxmlformats.org/drawingml/2006/main" xmlns:r="http://schemas.openxmlformats.org/officeDocument/2006/relationships" xmlns:p="http://schemas.openxmlformats.org/presentationml/2006/main">
+  <p:cSld>
+    <p:spTree>
+      <p:nvGrpSpPr>
+        <p:cNvPr id="1" name=""/>
+        <p:cNvGrpSpPr/>
+        <p:nvPr/>
+      </p:nvGrpSpPr>
+      <p:grpSpPr>
+        <a:xfrm>
+          <a:off x="0" y="0"/>
+          <a:ext cx="0" cy="0"/>
+          <a:chOff x="0" y="0"/>
+          <a:chExt cx="0" cy="0"/>
+        </a:xfrm>
+      </p:grpSpPr>
+      <p:sp>
+        <p:nvSpPr>
+          <p:cNvPr id="2" name="Slide Image Placeholder 1"/>
+          <p:cNvSpPr>
+            <a:spLocks noGrp="1" noRot="1" noChangeAspect="1"/>
+          </p:cNvSpPr>
+          <p:nvPr>
+            <p:ph type="sldImg"/>
+          </p:nvPr>
+        </p:nvSpPr>
+        <p:spPr/>
+      </p:sp>
+      <p:sp>
+        <p:nvSpPr>
+          <p:cNvPr id="3" name="Notes Placeholder 2"/>
+          <p:cNvSpPr>
+            <a:spLocks noGrp="1"/>
+          </p:cNvSpPr>
+          <p:nvPr>
+            <p:ph type="body" idx="1"/>
+          </p:nvPr>
+        </p:nvSpPr>
+        <p:spPr/>
+        <p:txBody>
+          <a:bodyPr>
+            <a:normAutofit/>
+          </a:bodyPr>
+          <a:lstStyle/>
+          <a:p>
+            <a:r>
+              <a:rPr lang="en-US" sz="1200" b="0" i="0" kern="1200" dirty="0" smtClean="0">
+                <a:solidFill>
+                  <a:schemeClr val="tx1"/>
+                </a:solidFill>
+                <a:latin typeface="Times" pitchFamily="18" charset="0"/>
+                <a:ea typeface="+mn-ea"/>
+                <a:cs typeface="+mn-cs"/>
+              </a:rPr>
+              <a:t>There are a number of ways to deal with the proliferation of cloud APIs. Cohen proposes a "unified cloud interface," or cloud broker, that implements industry standard definitions. Dave Powers, an IT pro with Eli Lilly, talks of a third-party "orchestration layer" as a way of managing multiple cloud services. Clouds</a:t>
+            </a:r>
+            <a:r>
+              <a:rPr lang="en-US" sz="1200" b="0" i="0" kern="1200" baseline="0" dirty="0" smtClean="0">
+                <a:solidFill>
+                  <a:schemeClr val="tx1"/>
+                </a:solidFill>
+                <a:latin typeface="Times" pitchFamily="18" charset="0"/>
+                <a:ea typeface="+mn-ea"/>
+                <a:cs typeface="+mn-cs"/>
+              </a:rPr>
+              <a:t> </a:t>
+            </a:r>
+            <a:r>
+              <a:rPr lang="en-US" sz="1200" b="0" i="0" kern="1200" baseline="0" smtClean="0">
+                <a:solidFill>
+                  <a:schemeClr val="tx1"/>
+                </a:solidFill>
+                <a:latin typeface="Times" pitchFamily="18" charset="0"/>
+                <a:ea typeface="+mn-ea"/>
+                <a:cs typeface="+mn-cs"/>
+              </a:rPr>
+              <a:t>within clouds?</a:t>
+            </a:r>
+            <a:endParaRPr lang="en-CA" dirty="0"/>
+          </a:p>
+        </p:txBody>
+      </p:sp>
+      <p:sp>
+        <p:nvSpPr>
+          <p:cNvPr id="4" name="Slide Number Placeholder 3"/>
+          <p:cNvSpPr>
+            <a:spLocks noGrp="1"/>
+          </p:cNvSpPr>
+          <p:nvPr>
+            <p:ph type="sldNum" sz="quarter" idx="10"/>
+          </p:nvPr>
+        </p:nvSpPr>
+        <p:spPr/>
+        <p:txBody>
+          <a:bodyPr/>
+          <a:lstStyle/>
+          <a:p>
+            <a:fld id="{E00E7371-80A2-4894-A71A-E39284D7ECA2}" type="slidenum">
+              <a:rPr lang="en-US" smtClean="0"/>
+              <a:pPr/>
+              <a:t>13</a:t>
+            </a:fld>
+            <a:endParaRPr lang="en-US"/>
+          </a:p>
+        </p:txBody>
+      </p:sp>
+    </p:spTree>
+  </p:cSld>
+  <p:clrMapOvr>
+    <a:masterClrMapping/>
+  </p:clrMapOvr>
+</p:notes>
+</file>
+
+<file path=ppt/notesSlides/notesSlide12.xml><?xml version="1.0" encoding="utf-8"?>
+<p:notes xmlns:a="http://schemas.openxmlformats.org/drawingml/2006/main" xmlns:r="http://schemas.openxmlformats.org/officeDocument/2006/relationships" xmlns:p="http://schemas.openxmlformats.org/presentationml/2006/main">
+  <p:cSld>
+    <p:spTree>
+      <p:nvGrpSpPr>
+        <p:cNvPr id="1" name=""/>
+        <p:cNvGrpSpPr/>
+        <p:nvPr/>
+      </p:nvGrpSpPr>
+      <p:grpSpPr>
+        <a:xfrm>
+          <a:off x="0" y="0"/>
+          <a:ext cx="0" cy="0"/>
+          <a:chOff x="0" y="0"/>
+          <a:chExt cx="0" cy="0"/>
+        </a:xfrm>
+      </p:grpSpPr>
+      <p:sp>
+        <p:nvSpPr>
+          <p:cNvPr id="2" name="Slide Image Placeholder 1"/>
+          <p:cNvSpPr>
+            <a:spLocks noGrp="1" noRot="1" noChangeAspect="1"/>
+          </p:cNvSpPr>
+          <p:nvPr>
+            <p:ph type="sldImg"/>
+          </p:nvPr>
+        </p:nvSpPr>
+        <p:spPr/>
+      </p:sp>
+      <p:sp>
+        <p:nvSpPr>
+          <p:cNvPr id="3" name="Notes Placeholder 2"/>
+          <p:cNvSpPr>
+            <a:spLocks noGrp="1"/>
+          </p:cNvSpPr>
+          <p:nvPr>
+            <p:ph type="body" idx="1"/>
+          </p:nvPr>
+        </p:nvSpPr>
+        <p:spPr/>
+        <p:txBody>
+          <a:bodyPr>
+            <a:normAutofit/>
+          </a:bodyPr>
+          <a:lstStyle/>
+          <a:p>
+            <a:endParaRPr lang="en-CA" dirty="0"/>
+          </a:p>
+        </p:txBody>
+      </p:sp>
+      <p:sp>
+        <p:nvSpPr>
+          <p:cNvPr id="4" name="Slide Number Placeholder 3"/>
+          <p:cNvSpPr>
+            <a:spLocks noGrp="1"/>
+          </p:cNvSpPr>
+          <p:nvPr>
+            <p:ph type="sldNum" sz="quarter" idx="10"/>
+          </p:nvPr>
+        </p:nvSpPr>
+        <p:spPr/>
+        <p:txBody>
+          <a:bodyPr/>
+          <a:lstStyle/>
+          <a:p>
+            <a:fld id="{E00E7371-80A2-4894-A71A-E39284D7ECA2}" type="slidenum">
+              <a:rPr lang="en-US" smtClean="0"/>
+              <a:pPr/>
+              <a:t>14</a:t>
             </a:fld>
             <a:endParaRPr lang="en-US"/>
           </a:p>
@@ -5040,19 +5239,7 @@
           <a:p>
             <a:r>
               <a:rPr lang="en-US" dirty="0" smtClean="0"/>
-              <a:t>Quality of </a:t>
-            </a:r>
-            <a:r>
-              <a:rPr lang="en-US" dirty="0" smtClean="0"/>
-              <a:t>Service in combination with qualitative analysis </a:t>
-            </a:r>
-            <a:r>
-              <a:rPr lang="en-US" dirty="0" smtClean="0"/>
-              <a:t>would be the ideal benchmark for Cloud Computing </a:t>
-            </a:r>
-            <a:r>
-              <a:rPr lang="en-US" dirty="0" smtClean="0"/>
-              <a:t>services.</a:t>
+              <a:t>Quality of Service in combination with qualitative analysis would be the ideal benchmark for Cloud Computing services.</a:t>
             </a:r>
           </a:p>
           <a:p>
@@ -5065,17 +5252,8 @@
             </a:r>
             <a:r>
               <a:rPr lang="en-US" dirty="0" smtClean="0"/>
-              <a:t>: The </a:t>
-            </a:r>
-            <a:r>
-              <a:rPr lang="en-US" dirty="0" smtClean="0"/>
-              <a:t>ability of a network (including applications, hosts, and infrastructure devices) to deliver traffic with minimum delay and maximum availability</a:t>
-            </a:r>
-            <a:r>
-              <a:rPr lang="en-US" dirty="0" smtClean="0"/>
-              <a:t>.</a:t>
-            </a:r>
-            <a:endParaRPr lang="en-US" dirty="0" smtClean="0"/>
+              <a:t>: The ability of a network (including applications, hosts, and infrastructure devices) to deliver traffic with minimum delay and maximum availability.</a:t>
+            </a:r>
           </a:p>
           <a:p>
             <a:endParaRPr lang="en-US" dirty="0" smtClean="0"/>
@@ -5159,11 +5337,11 @@
           <a:lstStyle/>
           <a:p>
             <a:fld id="{284CB430-D7DB-450E-8FF5-AD4ED9D28849}" type="slidenum">
-              <a:rPr lang="en-US"/>
+              <a:rPr lang="en-US" smtClean="0"/>
               <a:pPr/>
               <a:t>12</a:t>
             </a:fld>
-            <a:endParaRPr lang="en-US"/>
+            <a:endParaRPr lang="en-US" dirty="0"/>
           </a:p>
         </p:txBody>
       </p:sp>
@@ -5184,7 +5362,7 @@
           <a:p>
             <a:r>
               <a:rPr lang="en-US" dirty="0" smtClean="0"/>
-              <a:t>References:</a:t>
+              <a:t>Cloud Computing Performance</a:t>
             </a:r>
             <a:endParaRPr lang="en-US" dirty="0"/>
           </a:p>
@@ -5211,6 +5389,631 @@
           <a:lstStyle/>
           <a:p>
             <a:r>
+              <a:rPr lang="en-US" dirty="0" smtClean="0"/>
+              <a:t>Cloud computing </a:t>
+            </a:r>
+            <a:r>
+              <a:rPr lang="en-US" dirty="0" smtClean="0"/>
+              <a:t>is </a:t>
+            </a:r>
+            <a:r>
+              <a:rPr lang="en-US" dirty="0" smtClean="0"/>
+              <a:t>the </a:t>
+            </a:r>
+            <a:r>
+              <a:rPr lang="en-US" dirty="0" smtClean="0"/>
+              <a:t>future for </a:t>
+            </a:r>
+            <a:r>
+              <a:rPr lang="en-US" dirty="0" smtClean="0"/>
+              <a:t>low power, high efficiency</a:t>
+            </a:r>
+            <a:r>
+              <a:rPr lang="en-US" dirty="0" smtClean="0"/>
+              <a:t>, and </a:t>
+            </a:r>
+            <a:r>
+              <a:rPr lang="en-US" dirty="0" smtClean="0"/>
+              <a:t>low cost consumer electronics. </a:t>
+            </a:r>
+          </a:p>
+          <a:p>
+            <a:pPr lvl="1"/>
+            <a:endParaRPr lang="en-US" dirty="0" smtClean="0"/>
+          </a:p>
+          <a:p>
+            <a:pPr lvl="1"/>
+            <a:endParaRPr lang="en-US" dirty="0" smtClean="0"/>
+          </a:p>
+          <a:p>
+            <a:pPr lvl="1"/>
+            <a:r>
+              <a:rPr lang="en-US" dirty="0" smtClean="0"/>
+              <a:t>Google Chrome Notebook</a:t>
+            </a:r>
+          </a:p>
+          <a:p>
+            <a:pPr lvl="1"/>
+            <a:endParaRPr lang="en-US" dirty="0" smtClean="0"/>
+          </a:p>
+          <a:p>
+            <a:pPr lvl="1"/>
+            <a:endParaRPr lang="en-US" dirty="0" smtClean="0"/>
+          </a:p>
+          <a:p>
+            <a:pPr lvl="1"/>
+            <a:endParaRPr lang="en-US" dirty="0" smtClean="0"/>
+          </a:p>
+          <a:p>
+            <a:pPr lvl="1">
+              <a:buNone/>
+            </a:pPr>
+            <a:endParaRPr lang="en-US" dirty="0" smtClean="0"/>
+          </a:p>
+          <a:p>
+            <a:pPr lvl="1"/>
+            <a:endParaRPr lang="en-US" dirty="0" smtClean="0"/>
+          </a:p>
+          <a:p>
+            <a:pPr lvl="1"/>
+            <a:r>
+              <a:rPr lang="en-US" dirty="0" err="1" smtClean="0"/>
+              <a:t>OnLive</a:t>
+            </a:r>
+            <a:r>
+              <a:rPr lang="en-US" dirty="0" smtClean="0"/>
+              <a:t> video game console</a:t>
+            </a:r>
+          </a:p>
+        </p:txBody>
+      </p:sp>
+      <p:pic>
+        <p:nvPicPr>
+          <p:cNvPr id="33794" name="Picture 2" descr="C:\Users\Michail\AppData\Local\Microsoft\Windows\Temporary Internet Files\Content.IE5\I2BJRY1G\MC900441458[1].png"/>
+          <p:cNvPicPr>
+            <a:picLocks noChangeAspect="1" noChangeArrowheads="1"/>
+          </p:cNvPicPr>
+          <p:nvPr/>
+        </p:nvPicPr>
+        <p:blipFill>
+          <a:blip r:embed="rId3" cstate="print"/>
+          <a:srcRect/>
+          <a:stretch>
+            <a:fillRect/>
+          </a:stretch>
+        </p:blipFill>
+        <p:spPr bwMode="auto">
+          <a:xfrm>
+            <a:off x="-304800" y="1066800"/>
+            <a:ext cx="2438400" cy="2438400"/>
+          </a:xfrm>
+          <a:prstGeom prst="rect">
+            <a:avLst/>
+          </a:prstGeom>
+          <a:noFill/>
+        </p:spPr>
+      </p:pic>
+      <p:pic>
+        <p:nvPicPr>
+          <p:cNvPr id="5122" name="Picture 2" descr="http://www.tonybates.ca/wp-content/uploads/Google-Chrome-Notebook.jpg"/>
+          <p:cNvPicPr>
+            <a:picLocks noChangeAspect="1" noChangeArrowheads="1"/>
+          </p:cNvPicPr>
+          <p:nvPr/>
+        </p:nvPicPr>
+        <p:blipFill>
+          <a:blip r:embed="rId4" cstate="print"/>
+          <a:srcRect/>
+          <a:stretch>
+            <a:fillRect/>
+          </a:stretch>
+        </p:blipFill>
+        <p:spPr bwMode="auto">
+          <a:xfrm>
+            <a:off x="6019800" y="2971800"/>
+            <a:ext cx="1905000" cy="1295400"/>
+          </a:xfrm>
+          <a:prstGeom prst="rect">
+            <a:avLst/>
+          </a:prstGeom>
+          <a:noFill/>
+        </p:spPr>
+      </p:pic>
+      <p:pic>
+        <p:nvPicPr>
+          <p:cNvPr id="5126" name="Picture 6" descr="http://www.goozernation.com/video-games/images/stories/onlive-controller.jpg"/>
+          <p:cNvPicPr>
+            <a:picLocks noChangeAspect="1" noChangeArrowheads="1"/>
+          </p:cNvPicPr>
+          <p:nvPr/>
+        </p:nvPicPr>
+        <p:blipFill>
+          <a:blip r:embed="rId5" cstate="print"/>
+          <a:srcRect/>
+          <a:stretch>
+            <a:fillRect/>
+          </a:stretch>
+        </p:blipFill>
+        <p:spPr bwMode="auto">
+          <a:xfrm>
+            <a:off x="6096000" y="4495800"/>
+            <a:ext cx="1866900" cy="1866900"/>
+          </a:xfrm>
+          <a:prstGeom prst="rect">
+            <a:avLst/>
+          </a:prstGeom>
+          <a:noFill/>
+        </p:spPr>
+      </p:pic>
+    </p:spTree>
+  </p:cSld>
+  <p:clrMapOvr>
+    <a:masterClrMapping/>
+  </p:clrMapOvr>
+  <p:transition>
+    <p:fade/>
+  </p:transition>
+  <p:timing>
+    <p:tnLst>
+      <p:par>
+        <p:cTn id="1" dur="indefinite" restart="never" nodeType="tmRoot">
+          <p:childTnLst>
+            <p:seq concurrent="1" nextAc="seek">
+              <p:cTn id="2" dur="indefinite" nodeType="mainSeq">
+                <p:childTnLst>
+                  <p:par>
+                    <p:cTn id="3" fill="hold">
+                      <p:stCondLst>
+                        <p:cond delay="indefinite"/>
+                      </p:stCondLst>
+                      <p:childTnLst>
+                        <p:par>
+                          <p:cTn id="4" fill="hold">
+                            <p:stCondLst>
+                              <p:cond delay="0"/>
+                            </p:stCondLst>
+                            <p:childTnLst>
+                              <p:par>
+                                <p:cTn id="5" presetID="1" presetClass="entr" presetSubtype="0" fill="hold" nodeType="clickEffect">
+                                  <p:stCondLst>
+                                    <p:cond delay="0"/>
+                                  </p:stCondLst>
+                                  <p:childTnLst>
+                                    <p:set>
+                                      <p:cBhvr>
+                                        <p:cTn id="6" dur="1" fill="hold">
+                                          <p:stCondLst>
+                                            <p:cond delay="0"/>
+                                          </p:stCondLst>
+                                        </p:cTn>
+                                        <p:tgtEl>
+                                          <p:spTgt spid="4101">
+                                            <p:txEl>
+                                              <p:pRg st="3" end="3"/>
+                                            </p:txEl>
+                                          </p:spTgt>
+                                        </p:tgtEl>
+                                        <p:attrNameLst>
+                                          <p:attrName>style.visibility</p:attrName>
+                                        </p:attrNameLst>
+                                      </p:cBhvr>
+                                      <p:to>
+                                        <p:strVal val="visible"/>
+                                      </p:to>
+                                    </p:set>
+                                  </p:childTnLst>
+                                </p:cTn>
+                              </p:par>
+                              <p:par>
+                                <p:cTn id="7" presetID="1" presetClass="entr" presetSubtype="0" fill="hold" nodeType="withEffect">
+                                  <p:stCondLst>
+                                    <p:cond delay="0"/>
+                                  </p:stCondLst>
+                                  <p:childTnLst>
+                                    <p:set>
+                                      <p:cBhvr>
+                                        <p:cTn id="8" dur="1" fill="hold">
+                                          <p:stCondLst>
+                                            <p:cond delay="0"/>
+                                          </p:stCondLst>
+                                        </p:cTn>
+                                        <p:tgtEl>
+                                          <p:spTgt spid="5122"/>
+                                        </p:tgtEl>
+                                        <p:attrNameLst>
+                                          <p:attrName>style.visibility</p:attrName>
+                                        </p:attrNameLst>
+                                      </p:cBhvr>
+                                      <p:to>
+                                        <p:strVal val="visible"/>
+                                      </p:to>
+                                    </p:set>
+                                  </p:childTnLst>
+                                </p:cTn>
+                              </p:par>
+                            </p:childTnLst>
+                          </p:cTn>
+                        </p:par>
+                      </p:childTnLst>
+                    </p:cTn>
+                  </p:par>
+                  <p:par>
+                    <p:cTn id="9" fill="hold">
+                      <p:stCondLst>
+                        <p:cond delay="indefinite"/>
+                      </p:stCondLst>
+                      <p:childTnLst>
+                        <p:par>
+                          <p:cTn id="10" fill="hold">
+                            <p:stCondLst>
+                              <p:cond delay="0"/>
+                            </p:stCondLst>
+                            <p:childTnLst>
+                              <p:par>
+                                <p:cTn id="11" presetID="1" presetClass="entr" presetSubtype="0" fill="hold" nodeType="clickEffect">
+                                  <p:stCondLst>
+                                    <p:cond delay="0"/>
+                                  </p:stCondLst>
+                                  <p:childTnLst>
+                                    <p:set>
+                                      <p:cBhvr>
+                                        <p:cTn id="12" dur="1" fill="hold">
+                                          <p:stCondLst>
+                                            <p:cond delay="0"/>
+                                          </p:stCondLst>
+                                        </p:cTn>
+                                        <p:tgtEl>
+                                          <p:spTgt spid="4101">
+                                            <p:txEl>
+                                              <p:pRg st="9" end="9"/>
+                                            </p:txEl>
+                                          </p:spTgt>
+                                        </p:tgtEl>
+                                        <p:attrNameLst>
+                                          <p:attrName>style.visibility</p:attrName>
+                                        </p:attrNameLst>
+                                      </p:cBhvr>
+                                      <p:to>
+                                        <p:strVal val="visible"/>
+                                      </p:to>
+                                    </p:set>
+                                  </p:childTnLst>
+                                </p:cTn>
+                              </p:par>
+                              <p:par>
+                                <p:cTn id="13" presetID="1" presetClass="entr" presetSubtype="0" fill="hold" nodeType="withEffect">
+                                  <p:stCondLst>
+                                    <p:cond delay="0"/>
+                                  </p:stCondLst>
+                                  <p:childTnLst>
+                                    <p:set>
+                                      <p:cBhvr>
+                                        <p:cTn id="14" dur="1" fill="hold">
+                                          <p:stCondLst>
+                                            <p:cond delay="0"/>
+                                          </p:stCondLst>
+                                        </p:cTn>
+                                        <p:tgtEl>
+                                          <p:spTgt spid="5126"/>
+                                        </p:tgtEl>
+                                        <p:attrNameLst>
+                                          <p:attrName>style.visibility</p:attrName>
+                                        </p:attrNameLst>
+                                      </p:cBhvr>
+                                      <p:to>
+                                        <p:strVal val="visible"/>
+                                      </p:to>
+                                    </p:set>
+                                  </p:childTnLst>
+                                </p:cTn>
+                              </p:par>
+                            </p:childTnLst>
+                          </p:cTn>
+                        </p:par>
+                      </p:childTnLst>
+                    </p:cTn>
+                  </p:par>
+                </p:childTnLst>
+              </p:cTn>
+              <p:prevCondLst>
+                <p:cond evt="onPrev" delay="0">
+                  <p:tgtEl>
+                    <p:sldTgt/>
+                  </p:tgtEl>
+                </p:cond>
+              </p:prevCondLst>
+              <p:nextCondLst>
+                <p:cond evt="onNext" delay="0">
+                  <p:tgtEl>
+                    <p:sldTgt/>
+                  </p:tgtEl>
+                </p:cond>
+              </p:nextCondLst>
+            </p:seq>
+          </p:childTnLst>
+        </p:cTn>
+      </p:par>
+    </p:tnLst>
+  </p:timing>
+</p:sld>
+</file>
+
+<file path=ppt/slides/slide13.xml><?xml version="1.0" encoding="utf-8"?>
+<p:sld xmlns:a="http://schemas.openxmlformats.org/drawingml/2006/main" xmlns:r="http://schemas.openxmlformats.org/officeDocument/2006/relationships" xmlns:p="http://schemas.openxmlformats.org/presentationml/2006/main">
+  <p:cSld>
+    <p:spTree>
+      <p:nvGrpSpPr>
+        <p:cNvPr id="1" name=""/>
+        <p:cNvGrpSpPr/>
+        <p:nvPr/>
+      </p:nvGrpSpPr>
+      <p:grpSpPr>
+        <a:xfrm>
+          <a:off x="0" y="0"/>
+          <a:ext cx="0" cy="0"/>
+          <a:chOff x="0" y="0"/>
+          <a:chExt cx="0" cy="0"/>
+        </a:xfrm>
+      </p:grpSpPr>
+      <p:sp>
+        <p:nvSpPr>
+          <p:cNvPr id="4" name="Slide Number Placeholder 3"/>
+          <p:cNvSpPr>
+            <a:spLocks noGrp="1"/>
+          </p:cNvSpPr>
+          <p:nvPr>
+            <p:ph type="sldNum" sz="quarter" idx="10"/>
+          </p:nvPr>
+        </p:nvSpPr>
+        <p:spPr/>
+        <p:txBody>
+          <a:bodyPr/>
+          <a:lstStyle/>
+          <a:p>
+            <a:fld id="{284CB430-D7DB-450E-8FF5-AD4ED9D28849}" type="slidenum">
+              <a:rPr lang="en-US" smtClean="0"/>
+              <a:pPr/>
+              <a:t>13</a:t>
+            </a:fld>
+            <a:endParaRPr lang="en-US" dirty="0"/>
+          </a:p>
+        </p:txBody>
+      </p:sp>
+      <p:sp>
+        <p:nvSpPr>
+          <p:cNvPr id="4100" name="Rectangle 4"/>
+          <p:cNvSpPr>
+            <a:spLocks noGrp="1" noChangeArrowheads="1"/>
+          </p:cNvSpPr>
+          <p:nvPr>
+            <p:ph type="title"/>
+          </p:nvPr>
+        </p:nvSpPr>
+        <p:spPr/>
+        <p:txBody>
+          <a:bodyPr/>
+          <a:lstStyle/>
+          <a:p>
+            <a:r>
+              <a:rPr lang="en-US" dirty="0" smtClean="0"/>
+              <a:t>Cloud Computing </a:t>
+            </a:r>
+            <a:r>
+              <a:rPr lang="en-US" dirty="0" smtClean="0"/>
+              <a:t>Interoperability</a:t>
+            </a:r>
+            <a:endParaRPr lang="en-US" dirty="0"/>
+          </a:p>
+        </p:txBody>
+      </p:sp>
+      <p:sp>
+        <p:nvSpPr>
+          <p:cNvPr id="4101" name="Rectangle 5"/>
+          <p:cNvSpPr>
+            <a:spLocks noGrp="1" noChangeArrowheads="1"/>
+          </p:cNvSpPr>
+          <p:nvPr>
+            <p:ph type="body" idx="1"/>
+          </p:nvPr>
+        </p:nvSpPr>
+        <p:spPr>
+          <a:xfrm>
+            <a:off x="1981200" y="1752600"/>
+            <a:ext cx="6858000" cy="4419600"/>
+          </a:xfrm>
+        </p:spPr>
+        <p:txBody>
+          <a:bodyPr/>
+          <a:lstStyle/>
+          <a:p>
+            <a:r>
+              <a:rPr lang="en-US" dirty="0" smtClean="0"/>
+              <a:t>"There are different clouds from companies such as Microsoft, Amazon, </a:t>
+            </a:r>
+            <a:r>
+              <a:rPr lang="en-US" dirty="0" smtClean="0"/>
+              <a:t>… and </a:t>
+            </a:r>
+            <a:r>
+              <a:rPr lang="en-US" dirty="0" smtClean="0"/>
+              <a:t>Google, but a lack of interoperability between </a:t>
+            </a:r>
+            <a:r>
+              <a:rPr lang="en-US" dirty="0" smtClean="0"/>
+              <a:t>them.“ (Cerf, 2010)</a:t>
+            </a:r>
+            <a:endParaRPr lang="en-US" dirty="0" smtClean="0"/>
+          </a:p>
+          <a:p>
+            <a:r>
+              <a:rPr lang="en-US" dirty="0" smtClean="0"/>
+              <a:t>Applications are not compatible between clouds.</a:t>
+            </a:r>
+          </a:p>
+          <a:p>
+            <a:r>
+              <a:rPr lang="en-US" dirty="0" smtClean="0"/>
+              <a:t>No standards here, either…</a:t>
+            </a:r>
+          </a:p>
+          <a:p>
+            <a:pPr lvl="1"/>
+            <a:r>
+              <a:rPr lang="en-US" dirty="0" smtClean="0"/>
+              <a:t>few cloud standards organizations, such as </a:t>
+            </a:r>
+            <a:r>
+              <a:rPr lang="en-US" dirty="0" smtClean="0"/>
+              <a:t>the </a:t>
+            </a:r>
+            <a:r>
+              <a:rPr lang="en-US" b="1" dirty="0" smtClean="0"/>
+              <a:t>Open </a:t>
+            </a:r>
+            <a:r>
+              <a:rPr lang="en-US" b="1" dirty="0" smtClean="0"/>
+              <a:t>Cloud Consortium</a:t>
+            </a:r>
+            <a:r>
+              <a:rPr lang="en-US" dirty="0" smtClean="0"/>
+              <a:t>, are looking to drive some interoperability </a:t>
+            </a:r>
+            <a:r>
+              <a:rPr lang="en-US" dirty="0" smtClean="0"/>
+              <a:t>standards</a:t>
+            </a:r>
+          </a:p>
+        </p:txBody>
+      </p:sp>
+      <p:pic>
+        <p:nvPicPr>
+          <p:cNvPr id="33794" name="Picture 2" descr="C:\Users\Michail\AppData\Local\Microsoft\Windows\Temporary Internet Files\Content.IE5\I2BJRY1G\MC900441458[1].png"/>
+          <p:cNvPicPr>
+            <a:picLocks noChangeAspect="1" noChangeArrowheads="1"/>
+          </p:cNvPicPr>
+          <p:nvPr/>
+        </p:nvPicPr>
+        <p:blipFill>
+          <a:blip r:embed="rId3" cstate="print"/>
+          <a:srcRect/>
+          <a:stretch>
+            <a:fillRect/>
+          </a:stretch>
+        </p:blipFill>
+        <p:spPr bwMode="auto">
+          <a:xfrm>
+            <a:off x="-304800" y="1066800"/>
+            <a:ext cx="2438400" cy="2438400"/>
+          </a:xfrm>
+          <a:prstGeom prst="rect">
+            <a:avLst/>
+          </a:prstGeom>
+          <a:noFill/>
+        </p:spPr>
+      </p:pic>
+    </p:spTree>
+  </p:cSld>
+  <p:clrMapOvr>
+    <a:masterClrMapping/>
+  </p:clrMapOvr>
+  <p:transition>
+    <p:fade/>
+  </p:transition>
+  <p:timing>
+    <p:tnLst>
+      <p:par>
+        <p:cTn id="1" dur="indefinite" restart="never" nodeType="tmRoot"/>
+      </p:par>
+    </p:tnLst>
+  </p:timing>
+</p:sld>
+</file>
+
+<file path=ppt/slides/slide14.xml><?xml version="1.0" encoding="utf-8"?>
+<p:sld xmlns:a="http://schemas.openxmlformats.org/drawingml/2006/main" xmlns:r="http://schemas.openxmlformats.org/officeDocument/2006/relationships" xmlns:p="http://schemas.openxmlformats.org/presentationml/2006/main">
+  <p:cSld>
+    <p:spTree>
+      <p:nvGrpSpPr>
+        <p:cNvPr id="1" name=""/>
+        <p:cNvGrpSpPr/>
+        <p:nvPr/>
+      </p:nvGrpSpPr>
+      <p:grpSpPr>
+        <a:xfrm>
+          <a:off x="0" y="0"/>
+          <a:ext cx="0" cy="0"/>
+          <a:chOff x="0" y="0"/>
+          <a:chExt cx="0" cy="0"/>
+        </a:xfrm>
+      </p:grpSpPr>
+      <p:sp>
+        <p:nvSpPr>
+          <p:cNvPr id="4" name="Slide Number Placeholder 3"/>
+          <p:cNvSpPr>
+            <a:spLocks noGrp="1"/>
+          </p:cNvSpPr>
+          <p:nvPr>
+            <p:ph type="sldNum" sz="quarter" idx="10"/>
+          </p:nvPr>
+        </p:nvSpPr>
+        <p:spPr/>
+        <p:txBody>
+          <a:bodyPr/>
+          <a:lstStyle/>
+          <a:p>
+            <a:fld id="{284CB430-D7DB-450E-8FF5-AD4ED9D28849}" type="slidenum">
+              <a:rPr lang="en-US"/>
+              <a:pPr/>
+              <a:t>14</a:t>
+            </a:fld>
+            <a:endParaRPr lang="en-US"/>
+          </a:p>
+        </p:txBody>
+      </p:sp>
+      <p:sp>
+        <p:nvSpPr>
+          <p:cNvPr id="4100" name="Rectangle 4"/>
+          <p:cNvSpPr>
+            <a:spLocks noGrp="1" noChangeArrowheads="1"/>
+          </p:cNvSpPr>
+          <p:nvPr>
+            <p:ph type="title"/>
+          </p:nvPr>
+        </p:nvSpPr>
+        <p:spPr/>
+        <p:txBody>
+          <a:bodyPr/>
+          <a:lstStyle/>
+          <a:p>
+            <a:r>
+              <a:rPr lang="en-US" dirty="0" smtClean="0"/>
+              <a:t>References:</a:t>
+            </a:r>
+            <a:endParaRPr lang="en-US" dirty="0"/>
+          </a:p>
+        </p:txBody>
+      </p:sp>
+      <p:sp>
+        <p:nvSpPr>
+          <p:cNvPr id="4101" name="Rectangle 5"/>
+          <p:cNvSpPr>
+            <a:spLocks noGrp="1" noChangeArrowheads="1"/>
+          </p:cNvSpPr>
+          <p:nvPr>
+            <p:ph type="body" idx="1"/>
+          </p:nvPr>
+        </p:nvSpPr>
+        <p:spPr>
+          <a:xfrm>
+            <a:off x="1981200" y="1752600"/>
+            <a:ext cx="6858000" cy="4419600"/>
+          </a:xfrm>
+        </p:spPr>
+        <p:txBody>
+          <a:bodyPr/>
+          <a:lstStyle/>
+          <a:p>
+            <a:r>
               <a:rPr lang="en-US" sz="1400" dirty="0" smtClean="0"/>
               <a:t>Mackey, Dick (2010). </a:t>
             </a:r>
@@ -5283,7 +6086,45 @@
             </a:r>
             <a:r>
               <a:rPr lang="en-CA" sz="1100" dirty="0" smtClean="0"/>
-              <a:t>http://www.networksasia.net/content/cloud-performance-metrics-no-standards-so-mileage-varies</a:t>
+              <a:t>http://</a:t>
+            </a:r>
+            <a:r>
+              <a:rPr lang="en-CA" sz="1100" dirty="0" smtClean="0"/>
+              <a:t>www.networksasia.net/content/cloud-performance-metrics-no-standards-so-mileage-varies</a:t>
+            </a:r>
+          </a:p>
+          <a:p>
+            <a:r>
+              <a:rPr lang="en-CA" sz="1400" dirty="0" smtClean="0"/>
+              <a:t>Sun, Raymond J (2010</a:t>
+            </a:r>
+            <a:r>
+              <a:rPr lang="en-CA" sz="1400" dirty="0" smtClean="0"/>
+              <a:t>). </a:t>
+            </a:r>
+            <a:r>
+              <a:rPr lang="en-CA" sz="1400" dirty="0" smtClean="0"/>
+              <a:t>“</a:t>
+            </a:r>
+            <a:r>
+              <a:rPr lang="en-US" sz="1400" dirty="0" smtClean="0"/>
+              <a:t>Cloud Computing: Looking for Security, Reliability and </a:t>
+            </a:r>
+            <a:r>
+              <a:rPr lang="en-US" sz="1400" dirty="0" smtClean="0"/>
+              <a:t>Resiliency</a:t>
+            </a:r>
+            <a:r>
+              <a:rPr lang="en-CA" sz="1400" dirty="0" smtClean="0"/>
+              <a:t>” </a:t>
+            </a:r>
+            <a:r>
+              <a:rPr lang="en-CA" sz="1400" dirty="0" smtClean="0"/>
+              <a:t>Retrieved March 21, 2011, from </a:t>
+            </a:r>
+            <a:r>
+              <a:rPr lang="en-CA" sz="1100" dirty="0" smtClean="0"/>
+              <a:t>http://www.baselinemag.com/c/a/Utility-Computing/Cloud-Computing-Looking-for-Security-Reliability-Resiliency-466013/</a:t>
             </a:r>
           </a:p>
           <a:p>
@@ -6747,8 +7588,9 @@
             <a:pPr lvl="0"/>
             <a:r>
               <a:rPr lang="en-US" dirty="0" smtClean="0"/>
-              <a:t>What is reliability to you?</a:t>
-            </a:r>
+              <a:t>Reliability metrics</a:t>
+            </a:r>
+            <a:endParaRPr lang="en-US" dirty="0" smtClean="0"/>
           </a:p>
           <a:p>
             <a:pPr lvl="1"/>
@@ -6775,8 +7617,23 @@
             <a:pPr lvl="1"/>
             <a:r>
               <a:rPr lang="en-US" dirty="0" smtClean="0"/>
-              <a:t>Data corruption prevention</a:t>
-            </a:r>
+              <a:t>Data corruption </a:t>
+            </a:r>
+            <a:r>
+              <a:rPr lang="en-US" dirty="0" smtClean="0"/>
+              <a:t>prevention</a:t>
+            </a:r>
+          </a:p>
+          <a:p>
+            <a:pPr lvl="1"/>
+            <a:endParaRPr lang="en-US" dirty="0" smtClean="0"/>
+          </a:p>
+          <a:p>
+            <a:r>
+              <a:rPr lang="en-US" dirty="0" smtClean="0"/>
+              <a:t>Highly dependent on Cloud Computing service provided.</a:t>
+            </a:r>
+            <a:endParaRPr lang="en-US" dirty="0" smtClean="0"/>
           </a:p>
           <a:p>
             <a:pPr lvl="1"/>
@@ -7100,8 +7957,21 @@
             <a:pPr lvl="0"/>
             <a:r>
               <a:rPr lang="en-US" dirty="0" smtClean="0"/>
-              <a:t>Although Reliability in cloud computing is a major concern, it has proven to be a selling point.</a:t>
-            </a:r>
+              <a:t>Although Reliability in cloud computing is a major concern, it </a:t>
+            </a:r>
+            <a:r>
+              <a:rPr lang="en-US" dirty="0" smtClean="0"/>
+              <a:t>is a strong selling </a:t>
+            </a:r>
+            <a:r>
+              <a:rPr lang="en-US" dirty="0" smtClean="0"/>
+              <a:t>point</a:t>
+            </a:r>
+            <a:r>
+              <a:rPr lang="en-US" dirty="0" smtClean="0"/>
+              <a:t>. (Sun, 2010)</a:t>
+            </a:r>
+            <a:endParaRPr lang="en-US" dirty="0" smtClean="0"/>
           </a:p>
         </p:txBody>
       </p:sp>

</xml_diff>